<commit_message>
Neu Laden der Seite bei Anlage Gesuch
</commit_message>
<xml_diff>
--- a/Präsentationen/Webprogrammierung_2.pptx
+++ b/Präsentationen/Webprogrammierung_2.pptx
@@ -6230,7 +6230,7 @@
         <p:fade thruBlk="1"/>
       </p:transition>
     </mc:Choice>
-    <mc:Fallback xmlns:p15="http://schemas.microsoft.com/office/powerpoint/2012/main" xmlns:com="http://schemas.openxmlformats.org/drawingml/2006/compatibility" xmlns:pvml="urn:schemas-microsoft-com:office:powerpoint" xmlns:v="urn:schemas-microsoft-com:vml" xmlns:o="urn:schemas-microsoft-com:office:office" xmlns:dgm="http://schemas.openxmlformats.org/drawingml/2006/diagram" xmlns:c="http://schemas.openxmlformats.org/drawingml/2006/chart" xmlns:mv="urn:schemas-microsoft-com:mac:vml" xmlns="">
+    <mc:Fallback xmlns="" xmlns:mv="urn:schemas-microsoft-com:mac:vml" xmlns:c="http://schemas.openxmlformats.org/drawingml/2006/chart" xmlns:dgm="http://schemas.openxmlformats.org/drawingml/2006/diagram" xmlns:o="urn:schemas-microsoft-com:office:office" xmlns:v="urn:schemas-microsoft-com:vml" xmlns:pvml="urn:schemas-microsoft-com:office:powerpoint" xmlns:com="http://schemas.openxmlformats.org/drawingml/2006/compatibility" xmlns:p15="http://schemas.microsoft.com/office/powerpoint/2012/main">
       <p:transition spd="slow">
         <p:fade/>
       </p:transition>
@@ -6758,6 +6758,21 @@
               <a:rPr lang="de-DE" sz="1800" dirty="0"/>
               <a:t>Bessere Lösung zur Anlage eines Gesuches</a:t>
             </a:r>
+          </a:p>
+          <a:p>
+            <a:pPr lvl="0" indent="-342900">
+              <a:buSzPts val="1800"/>
+              <a:buChar char="-"/>
+            </a:pPr>
+            <a:r>
+              <a:rPr lang="de-DE" sz="1800" dirty="0"/>
+              <a:t>Kontaktinformationen </a:t>
+            </a:r>
+            <a:r>
+              <a:rPr lang="de-DE" sz="1800"/>
+              <a:t>bei Gesuchen</a:t>
+            </a:r>
+            <a:endParaRPr lang="de-DE" sz="1800" dirty="0"/>
           </a:p>
           <a:p>
             <a:endParaRPr lang="de-DE" dirty="0"/>

</xml_diff>